<commit_message>
Propuesta y Oferta economica
</commit_message>
<xml_diff>
--- a/Proyecto DRLW(02-04-2020).pptx
+++ b/Proyecto DRLW(02-04-2020).pptx
@@ -17,18 +17,18 @@
   <p:notesSz cx="6858000" cy="9144000"/>
   <p:embeddedFontLst>
     <p:embeddedFont>
-      <p:font typeface="Proxima Nova" panose="020B0604020202020204" charset="0"/>
+      <p:font typeface="Arial Rounded MT Bold" panose="020F0704030504030204" pitchFamily="34" charset="0"/>
       <p:regular r:id="rId7"/>
-      <p:bold r:id="rId8"/>
-      <p:italic r:id="rId9"/>
-      <p:boldItalic r:id="rId10"/>
-    </p:embeddedFont>
-    <p:embeddedFont>
-      <p:font typeface="Arial Rounded MT Bold" panose="020F0704030504030204" pitchFamily="34" charset="0"/>
-      <p:regular r:id="rId11"/>
     </p:embeddedFont>
     <p:embeddedFont>
       <p:font typeface="Calibri" panose="020F0502020204030204" pitchFamily="34" charset="0"/>
+      <p:regular r:id="rId8"/>
+      <p:bold r:id="rId9"/>
+      <p:italic r:id="rId10"/>
+      <p:boldItalic r:id="rId11"/>
+    </p:embeddedFont>
+    <p:embeddedFont>
+      <p:font typeface="Proxima Nova" panose="020B0604020202020204" charset="0"/>
       <p:regular r:id="rId12"/>
       <p:bold r:id="rId13"/>
       <p:italic r:id="rId14"/>
@@ -1024,7 +1024,7 @@
               </a:spcAft>
               <a:buNone/>
             </a:pPr>
-            <a:endParaRPr/>
+            <a:endParaRPr dirty="0"/>
           </a:p>
         </p:txBody>
       </p:sp>
@@ -7013,72 +7013,6 @@
           </a:p>
         </p:txBody>
       </p:sp>
-      <p:pic>
-        <p:nvPicPr>
-          <p:cNvPr id="1027" name="Picture 3"/>
-          <p:cNvPicPr>
-            <a:picLocks noChangeAspect="1" noChangeArrowheads="1"/>
-          </p:cNvPicPr>
-          <p:nvPr/>
-        </p:nvPicPr>
-        <p:blipFill>
-          <a:blip r:embed="rId4">
-            <a:clrChange>
-              <a:clrFrom>
-                <a:srgbClr val="FFFFFF"/>
-              </a:clrFrom>
-              <a:clrTo>
-                <a:srgbClr val="FFFFFF">
-                  <a:alpha val="0"/>
-                </a:srgbClr>
-              </a:clrTo>
-            </a:clrChange>
-          </a:blip>
-          <a:srcRect/>
-          <a:stretch>
-            <a:fillRect/>
-          </a:stretch>
-        </p:blipFill>
-        <p:spPr bwMode="auto">
-          <a:xfrm>
-            <a:off x="758757" y="3456562"/>
-            <a:ext cx="1165322" cy="324625"/>
-          </a:xfrm>
-          <a:prstGeom prst="rect">
-            <a:avLst/>
-          </a:prstGeom>
-          <a:noFill/>
-        </p:spPr>
-      </p:pic>
-      <p:sp>
-        <p:nvSpPr>
-          <p:cNvPr id="8" name="7 CuadroTexto"/>
-          <p:cNvSpPr txBox="1"/>
-          <p:nvPr/>
-        </p:nvSpPr>
-        <p:spPr>
-          <a:xfrm>
-            <a:off x="804153" y="3819726"/>
-            <a:ext cx="1043876" cy="230832"/>
-          </a:xfrm>
-          <a:prstGeom prst="rect">
-            <a:avLst/>
-          </a:prstGeom>
-          <a:noFill/>
-        </p:spPr>
-        <p:txBody>
-          <a:bodyPr wrap="none" rtlCol="0">
-            <a:spAutoFit/>
-          </a:bodyPr>
-          <a:lstStyle/>
-          <a:p>
-            <a:r>
-              <a:rPr lang="es-CO" sz="900" dirty="0"/>
-              <a:t>*Margen de 25%</a:t>
-            </a:r>
-          </a:p>
-        </p:txBody>
-      </p:sp>
       <p:sp>
         <p:nvSpPr>
           <p:cNvPr id="7" name="Google Shape;78;p16">
@@ -7095,7 +7029,7 @@
         </p:nvSpPr>
         <p:spPr>
           <a:xfrm>
-            <a:off x="209974" y="1684686"/>
+            <a:off x="95521" y="457200"/>
             <a:ext cx="2262887" cy="1104915"/>
           </a:xfrm>
           <a:prstGeom prst="rect">
@@ -7375,31 +7309,6 @@
               </a:rPr>
               <a:t>Propuesta Económica</a:t>
             </a:r>
-          </a:p>
-        </p:txBody>
-      </p:sp>
-      <p:sp>
-        <p:nvSpPr>
-          <p:cNvPr id="3" name="Título 2">
-            <a:extLst>
-              <a:ext uri="{FF2B5EF4-FFF2-40B4-BE49-F238E27FC236}">
-                <a16:creationId xmlns:a16="http://schemas.microsoft.com/office/drawing/2014/main" id="{E51FCE0F-23B0-499F-8E5E-29B3FEFBA11F}"/>
-              </a:ext>
-            </a:extLst>
-          </p:cNvPr>
-          <p:cNvSpPr>
-            <a:spLocks noGrp="1"/>
-          </p:cNvSpPr>
-          <p:nvPr>
-            <p:ph type="title"/>
-          </p:nvPr>
-        </p:nvSpPr>
-        <p:spPr/>
-        <p:txBody>
-          <a:bodyPr/>
-          <a:lstStyle/>
-          <a:p>
-            <a:endParaRPr lang="es-CO"/>
           </a:p>
         </p:txBody>
       </p:sp>
@@ -7494,28 +7403,6 @@
           </a:p>
         </p:txBody>
       </p:sp>
-      <p:pic>
-        <p:nvPicPr>
-          <p:cNvPr id="5" name="Imagen 4"/>
-          <p:cNvPicPr/>
-          <p:nvPr/>
-        </p:nvPicPr>
-        <p:blipFill>
-          <a:blip r:embed="rId3"/>
-          <a:stretch>
-            <a:fillRect/>
-          </a:stretch>
-        </p:blipFill>
-        <p:spPr>
-          <a:xfrm>
-            <a:off x="5014047" y="881513"/>
-            <a:ext cx="3667125" cy="3895725"/>
-          </a:xfrm>
-          <a:prstGeom prst="rect">
-            <a:avLst/>
-          </a:prstGeom>
-        </p:spPr>
-      </p:pic>
       <p:sp>
         <p:nvSpPr>
           <p:cNvPr id="3" name="Rectángulo 2"/>
@@ -7525,7 +7412,7 @@
         <p:spPr>
           <a:xfrm>
             <a:off x="187035" y="1227891"/>
-            <a:ext cx="4374573" cy="3857787"/>
+            <a:ext cx="4374573" cy="2988190"/>
           </a:xfrm>
           <a:prstGeom prst="rect">
             <a:avLst/>
@@ -7551,9 +7438,27 @@
                 <a:ea typeface="Calibri" panose="020F0502020204030204" pitchFamily="34" charset="0"/>
                 <a:cs typeface="Times New Roman" panose="02020603050405020304" pitchFamily="18" charset="0"/>
               </a:rPr>
-              <a:t>Gerente de ventas: David Mateo González Grimaldos</a:t>
+              <a:t>Propuesta de valor: Se ofrece una configuración personalizada como solución a los problemas de telefonía y comunicación que puedan llegar a tener las empresas entre sus distintas sucursales o sedes, mejorando el acoplamiento y rendimiento del negocio, esta solución no solo está caracterizada por la excelencia bien conocida de los ingenieros de la Escuela Colombiana de ingeniería sino también por los precios razonables y accesibles del servicio, precio que incluye el mantenimiento y la instalación del producto.</a:t>
             </a:r>
-            <a:endParaRPr lang="es-CO" sz="1200" dirty="0">
+          </a:p>
+          <a:p>
+            <a:pPr>
+              <a:lnSpc>
+                <a:spcPct val="107000"/>
+              </a:lnSpc>
+              <a:spcAft>
+                <a:spcPts val="800"/>
+              </a:spcAft>
+            </a:pPr>
+            <a:r>
+              <a:rPr lang="es-CO" sz="1200" dirty="0">
+                <a:latin typeface="Times New Roman" panose="02020603050405020304" pitchFamily="18" charset="0"/>
+                <a:ea typeface="Calibri" panose="020F0502020204030204" pitchFamily="34" charset="0"/>
+                <a:cs typeface="Times New Roman" panose="02020603050405020304" pitchFamily="18" charset="0"/>
+              </a:rPr>
+              <a:t>Precio de venta incluyendo computadores: $47´159,984 COP.</a:t>
+            </a:r>
+            <a:endParaRPr lang="es-CO" sz="1100" dirty="0">
               <a:latin typeface="Calibri" panose="020F0502020204030204" pitchFamily="34" charset="0"/>
               <a:ea typeface="Calibri" panose="020F0502020204030204" pitchFamily="34" charset="0"/>
               <a:cs typeface="Times New Roman" panose="02020603050405020304" pitchFamily="18" charset="0"/>
@@ -7569,61 +7474,14 @@
               </a:spcAft>
             </a:pPr>
             <a:r>
-              <a:rPr lang="es-CO" dirty="0">
+              <a:rPr lang="es-CO" sz="1200" dirty="0">
                 <a:latin typeface="Times New Roman" panose="02020603050405020304" pitchFamily="18" charset="0"/>
                 <a:ea typeface="Calibri" panose="020F0502020204030204" pitchFamily="34" charset="0"/>
                 <a:cs typeface="Times New Roman" panose="02020603050405020304" pitchFamily="18" charset="0"/>
               </a:rPr>
-              <a:t>Precio de venta incluyendo computadores: $54,493.317 COP.</a:t>
+              <a:t>Precio de venta sin incluir computadores: $31´159,984 COP.</a:t>
             </a:r>
-            <a:endParaRPr lang="es-CO" sz="1200" dirty="0">
-              <a:latin typeface="Calibri" panose="020F0502020204030204" pitchFamily="34" charset="0"/>
-              <a:ea typeface="Calibri" panose="020F0502020204030204" pitchFamily="34" charset="0"/>
-              <a:cs typeface="Times New Roman" panose="02020603050405020304" pitchFamily="18" charset="0"/>
-            </a:endParaRPr>
-          </a:p>
-          <a:p>
-            <a:pPr>
-              <a:lnSpc>
-                <a:spcPct val="107000"/>
-              </a:lnSpc>
-              <a:spcAft>
-                <a:spcPts val="800"/>
-              </a:spcAft>
-            </a:pPr>
-            <a:r>
-              <a:rPr lang="es-CO" dirty="0">
-                <a:latin typeface="Times New Roman" panose="02020603050405020304" pitchFamily="18" charset="0"/>
-                <a:ea typeface="Calibri" panose="020F0502020204030204" pitchFamily="34" charset="0"/>
-                <a:cs typeface="Times New Roman" panose="02020603050405020304" pitchFamily="18" charset="0"/>
-              </a:rPr>
-              <a:t>Precio de venta sin incluir computadores: $38,493.317 COP.</a:t>
-            </a:r>
-            <a:endParaRPr lang="es-CO" sz="1200" dirty="0">
-              <a:latin typeface="Calibri" panose="020F0502020204030204" pitchFamily="34" charset="0"/>
-              <a:ea typeface="Calibri" panose="020F0502020204030204" pitchFamily="34" charset="0"/>
-              <a:cs typeface="Times New Roman" panose="02020603050405020304" pitchFamily="18" charset="0"/>
-            </a:endParaRPr>
-          </a:p>
-          <a:p>
-            <a:pPr>
-              <a:lnSpc>
-                <a:spcPct val="107000"/>
-              </a:lnSpc>
-              <a:spcAft>
-                <a:spcPts val="800"/>
-              </a:spcAft>
-            </a:pPr>
-            <a:r>
-              <a:rPr lang="es-CO" dirty="0">
-                <a:latin typeface="Times New Roman" panose="02020603050405020304" pitchFamily="18" charset="0"/>
-                <a:ea typeface="Calibri" panose="020F0502020204030204" pitchFamily="34" charset="0"/>
-                <a:cs typeface="Times New Roman" panose="02020603050405020304" pitchFamily="18" charset="0"/>
-              </a:rPr>
-              <a:t>Propuesta de valor: Se ofrece una configuración personalizada como solución a los problemas de telefonía y comunicación que puedan llegar a tener las empresas entre sus distintas sucursales o sedes, mejorando el acoplamiento y rendimiento del negocio, esta solución no solo está caracterizada por la excelencia bien conocida de los ingenieros de la Escuela Colombiana de ingeniería sino también por los precios razonables y accesibles del servicio, precio que incluye el mantenimiento y la instalación del producto.</a:t>
-            </a:r>
-            <a:endParaRPr lang="es-CO" sz="1200" dirty="0">
-              <a:effectLst/>
+            <a:endParaRPr lang="es-CO" sz="1100" dirty="0">
               <a:latin typeface="Calibri" panose="020F0502020204030204" pitchFamily="34" charset="0"/>
               <a:ea typeface="Calibri" panose="020F0502020204030204" pitchFamily="34" charset="0"/>
               <a:cs typeface="Times New Roman" panose="02020603050405020304" pitchFamily="18" charset="0"/>
@@ -7631,6 +7489,36 @@
           </a:p>
         </p:txBody>
       </p:sp>
+      <p:pic>
+        <p:nvPicPr>
+          <p:cNvPr id="4" name="Imagen 3">
+            <a:extLst>
+              <a:ext uri="{FF2B5EF4-FFF2-40B4-BE49-F238E27FC236}">
+                <a16:creationId xmlns:a16="http://schemas.microsoft.com/office/drawing/2014/main" id="{845B1E35-3439-40EE-AA80-6EC250F0CDE5}"/>
+              </a:ext>
+            </a:extLst>
+          </p:cNvPr>
+          <p:cNvPicPr>
+            <a:picLocks noChangeAspect="1"/>
+          </p:cNvPicPr>
+          <p:nvPr/>
+        </p:nvPicPr>
+        <p:blipFill>
+          <a:blip r:embed="rId3"/>
+          <a:stretch>
+            <a:fillRect/>
+          </a:stretch>
+        </p:blipFill>
+        <p:spPr>
+          <a:xfrm>
+            <a:off x="4561608" y="966218"/>
+            <a:ext cx="4012952" cy="3211064"/>
+          </a:xfrm>
+          <a:prstGeom prst="rect">
+            <a:avLst/>
+          </a:prstGeom>
+        </p:spPr>
+      </p:pic>
     </p:spTree>
   </p:cSld>
   <p:clrMapOvr>

</xml_diff>